<commit_message>
Added Literature Review Content
</commit_message>
<xml_diff>
--- a/presentations/Comparative Analysis of Denoising Autoencoder and Convolutional Neural Networks for MNIST Classification..pptx
+++ b/presentations/Comparative Analysis of Denoising Autoencoder and Convolutional Neural Networks for MNIST Classification..pptx
@@ -9636,23 +9636,7 @@
             </a:pPr>
             <a:r>
               <a:rPr lang="en"/>
-              <a:t>Bharath Muthuswamy Paran,</a:t>
-            </a:r>
-            <a:endParaRPr/>
-          </a:p>
-          <a:p>
-            <a:pPr indent="0" lvl="0" marL="0" rtl="0" algn="l">
-              <a:spcBef>
-                <a:spcPts val="0"/>
-              </a:spcBef>
-              <a:spcAft>
-                <a:spcPts val="0"/>
-              </a:spcAft>
-              <a:buNone/>
-            </a:pPr>
-            <a:r>
-              <a:rPr lang="en"/>
-              <a:t>50325489.</a:t>
+              <a:t>Bharath Muthuswamy Paran.</a:t>
             </a:r>
             <a:endParaRPr/>
           </a:p>

</xml_diff>